<commit_message>
post presentation update - fix hyperlinks in presentation
just pdf and ppt of presentation modified
</commit_message>
<xml_diff>
--- a/Adventures in Data Munging.pptx
+++ b/Adventures in Data Munging.pptx
@@ -112,6 +112,11 @@
       </a:defRPr>
     </a:lvl9pPr>
   </p:defaultTextStyle>
+  <p:extLst>
+    <p:ext uri="{EFAFB233-063F-42B5-8137-9DF3F51BA10A}">
+      <p15:sldGuideLst xmlns:p15="http://schemas.microsoft.com/office/powerpoint/2012/main"/>
+    </p:ext>
+  </p:extLst>
 </p:presentation>
 </file>
 
@@ -7080,7 +7085,12 @@
             <p:ph idx="1"/>
           </p:nvPr>
         </p:nvSpPr>
-        <p:spPr/>
+        <p:spPr>
+          <a:xfrm>
+            <a:off x="647114" y="1744393"/>
+            <a:ext cx="10958732" cy="4600135"/>
+          </a:xfrm>
+        </p:spPr>
         <p:txBody>
           <a:bodyPr/>
           <a:lstStyle/>
@@ -7095,11 +7105,43 @@
             </a:r>
             <a:r>
               <a:rPr lang="en-US" dirty="0" smtClean="0"/>
-              <a:t> Notebook Saved to HTML provides a convenient way to tell this story: “</a:t>
+              <a:t> Notebook Saved to HTML provides a convenient way to tell this story</a:t>
+            </a:r>
+            <a:r>
+              <a:rPr lang="en-US" dirty="0" smtClean="0"/>
+              <a:t>:</a:t>
+            </a:r>
+          </a:p>
+          <a:p>
+            <a:pPr lvl="1"/>
+            <a:r>
+              <a:rPr lang="en-US" dirty="0" smtClean="0"/>
+              <a:t>Source: </a:t>
+            </a:r>
+            <a:r>
+              <a:rPr lang="en-US" dirty="0" smtClean="0"/>
+              <a:t>“</a:t>
             </a:r>
             <a:r>
               <a:rPr lang="en-US" dirty="0" smtClean="0">
-                <a:hlinkClick r:id="rId2" action="ppaction://hlinkfile"/>
+                <a:hlinkClick r:id="rId2"/>
+              </a:rPr>
+              <a:t>TMWP_CR_Spec_TableAnalysis1.ipynb</a:t>
+            </a:r>
+            <a:r>
+              <a:rPr lang="en-US" dirty="0" smtClean="0"/>
+              <a:t>”</a:t>
+            </a:r>
+          </a:p>
+          <a:p>
+            <a:pPr lvl="1"/>
+            <a:r>
+              <a:rPr lang="en-US" dirty="0" smtClean="0"/>
+              <a:t>In HTML:  “</a:t>
+            </a:r>
+            <a:r>
+              <a:rPr lang="en-US" dirty="0" smtClean="0">
+                <a:hlinkClick r:id="rId3"/>
               </a:rPr>
               <a:t>TMWP_CR_Spec_TableAnalysis1.html</a:t>
             </a:r>
@@ -7107,6 +7149,7 @@
               <a:rPr lang="en-US" dirty="0" smtClean="0"/>
               <a:t>”</a:t>
             </a:r>
+            <a:endParaRPr lang="en-US" dirty="0" smtClean="0"/>
           </a:p>
           <a:p>
             <a:r>

</xml_diff>